<commit_message>
finished code for table
time for debugging
</commit_message>
<xml_diff>
--- a/Project 1/Robin Hood Hashing.pptx
+++ b/Project 1/Robin Hood Hashing.pptx
@@ -14,8 +14,9 @@
     <p:sldId id="266" r:id="rId8"/>
     <p:sldId id="262" r:id="rId9"/>
     <p:sldId id="263" r:id="rId10"/>
-    <p:sldId id="264" r:id="rId11"/>
-    <p:sldId id="265" r:id="rId12"/>
+    <p:sldId id="267" r:id="rId11"/>
+    <p:sldId id="264" r:id="rId12"/>
+    <p:sldId id="265" r:id="rId13"/>
   </p:sldIdLst>
   <p:sldSz cx="12192000" cy="6858000"/>
   <p:notesSz cx="6858000" cy="9144000"/>
@@ -114,6 +115,11 @@
       </a:defRPr>
     </a:lvl9pPr>
   </p:defaultTextStyle>
+  <p:extLst>
+    <p:ext uri="{EFAFB233-063F-42B5-8137-9DF3F51BA10A}">
+      <p15:sldGuideLst xmlns:p15="http://schemas.microsoft.com/office/powerpoint/2012/main"/>
+    </p:ext>
+  </p:extLst>
 </p:presentation>
 </file>
 
@@ -305,7 +311,7 @@
           <a:p>
             <a:fld id="{169A2F6B-4E20-472E-BD1C-A374BC7CA75E}" type="datetimeFigureOut">
               <a:rPr lang="en-US" smtClean="0"/>
-              <a:t>2/17/2015</a:t>
+              <a:t>2/19/2015</a:t>
             </a:fld>
             <a:endParaRPr lang="en-US"/>
           </a:p>
@@ -643,7 +649,7 @@
           <a:p>
             <a:fld id="{169A2F6B-4E20-472E-BD1C-A374BC7CA75E}" type="datetimeFigureOut">
               <a:rPr lang="en-US" smtClean="0"/>
-              <a:t>2/17/2015</a:t>
+              <a:t>2/19/2015</a:t>
             </a:fld>
             <a:endParaRPr lang="en-US"/>
           </a:p>
@@ -1044,7 +1050,7 @@
           <a:p>
             <a:fld id="{169A2F6B-4E20-472E-BD1C-A374BC7CA75E}" type="datetimeFigureOut">
               <a:rPr lang="en-US" smtClean="0"/>
-              <a:t>2/17/2015</a:t>
+              <a:t>2/19/2015</a:t>
             </a:fld>
             <a:endParaRPr lang="en-US"/>
           </a:p>
@@ -1380,7 +1386,7 @@
           <a:p>
             <a:fld id="{169A2F6B-4E20-472E-BD1C-A374BC7CA75E}" type="datetimeFigureOut">
               <a:rPr lang="en-US" smtClean="0"/>
-              <a:t>2/17/2015</a:t>
+              <a:t>2/19/2015</a:t>
             </a:fld>
             <a:endParaRPr lang="en-US"/>
           </a:p>
@@ -1700,7 +1706,7 @@
           <a:p>
             <a:fld id="{169A2F6B-4E20-472E-BD1C-A374BC7CA75E}" type="datetimeFigureOut">
               <a:rPr lang="en-US" smtClean="0"/>
-              <a:t>2/17/2015</a:t>
+              <a:t>2/19/2015</a:t>
             </a:fld>
             <a:endParaRPr lang="en-US"/>
           </a:p>
@@ -2096,7 +2102,7 @@
           <a:p>
             <a:fld id="{169A2F6B-4E20-472E-BD1C-A374BC7CA75E}" type="datetimeFigureOut">
               <a:rPr lang="en-US" smtClean="0"/>
-              <a:t>2/17/2015</a:t>
+              <a:t>2/19/2015</a:t>
             </a:fld>
             <a:endParaRPr lang="en-US"/>
           </a:p>
@@ -2353,7 +2359,7 @@
           <a:p>
             <a:fld id="{169A2F6B-4E20-472E-BD1C-A374BC7CA75E}" type="datetimeFigureOut">
               <a:rPr lang="en-US" smtClean="0"/>
-              <a:t>2/17/2015</a:t>
+              <a:t>2/19/2015</a:t>
             </a:fld>
             <a:endParaRPr lang="en-US"/>
           </a:p>
@@ -2615,7 +2621,7 @@
           <a:p>
             <a:fld id="{169A2F6B-4E20-472E-BD1C-A374BC7CA75E}" type="datetimeFigureOut">
               <a:rPr lang="en-US" smtClean="0"/>
-              <a:t>2/17/2015</a:t>
+              <a:t>2/19/2015</a:t>
             </a:fld>
             <a:endParaRPr lang="en-US"/>
           </a:p>
@@ -2877,7 +2883,7 @@
           <a:p>
             <a:fld id="{169A2F6B-4E20-472E-BD1C-A374BC7CA75E}" type="datetimeFigureOut">
               <a:rPr lang="en-US" smtClean="0"/>
-              <a:t>2/17/2015</a:t>
+              <a:t>2/19/2015</a:t>
             </a:fld>
             <a:endParaRPr lang="en-US"/>
           </a:p>
@@ -3206,7 +3212,7 @@
           <a:p>
             <a:fld id="{169A2F6B-4E20-472E-BD1C-A374BC7CA75E}" type="datetimeFigureOut">
               <a:rPr lang="en-US" smtClean="0"/>
-              <a:t>2/17/2015</a:t>
+              <a:t>2/19/2015</a:t>
             </a:fld>
             <a:endParaRPr lang="en-US"/>
           </a:p>
@@ -3529,7 +3535,7 @@
           <a:p>
             <a:fld id="{169A2F6B-4E20-472E-BD1C-A374BC7CA75E}" type="datetimeFigureOut">
               <a:rPr lang="en-US" smtClean="0"/>
-              <a:t>2/17/2015</a:t>
+              <a:t>2/19/2015</a:t>
             </a:fld>
             <a:endParaRPr lang="en-US"/>
           </a:p>
@@ -3986,7 +3992,7 @@
           <a:p>
             <a:fld id="{169A2F6B-4E20-472E-BD1C-A374BC7CA75E}" type="datetimeFigureOut">
               <a:rPr lang="en-US" smtClean="0"/>
-              <a:t>2/17/2015</a:t>
+              <a:t>2/19/2015</a:t>
             </a:fld>
             <a:endParaRPr lang="en-US"/>
           </a:p>
@@ -4191,7 +4197,7 @@
           <a:p>
             <a:fld id="{169A2F6B-4E20-472E-BD1C-A374BC7CA75E}" type="datetimeFigureOut">
               <a:rPr lang="en-US" smtClean="0"/>
-              <a:t>2/17/2015</a:t>
+              <a:t>2/19/2015</a:t>
             </a:fld>
             <a:endParaRPr lang="en-US"/>
           </a:p>
@@ -4368,7 +4374,7 @@
           <a:p>
             <a:fld id="{169A2F6B-4E20-472E-BD1C-A374BC7CA75E}" type="datetimeFigureOut">
               <a:rPr lang="en-US" smtClean="0"/>
-              <a:t>2/17/2015</a:t>
+              <a:t>2/19/2015</a:t>
             </a:fld>
             <a:endParaRPr lang="en-US"/>
           </a:p>
@@ -4701,7 +4707,7 @@
           <a:p>
             <a:fld id="{169A2F6B-4E20-472E-BD1C-A374BC7CA75E}" type="datetimeFigureOut">
               <a:rPr lang="en-US" smtClean="0"/>
-              <a:t>2/17/2015</a:t>
+              <a:t>2/19/2015</a:t>
             </a:fld>
             <a:endParaRPr lang="en-US"/>
           </a:p>
@@ -5046,7 +5052,7 @@
           <a:p>
             <a:fld id="{169A2F6B-4E20-472E-BD1C-A374BC7CA75E}" type="datetimeFigureOut">
               <a:rPr lang="en-US" smtClean="0"/>
-              <a:t>2/17/2015</a:t>
+              <a:t>2/19/2015</a:t>
             </a:fld>
             <a:endParaRPr lang="en-US"/>
           </a:p>
@@ -7163,7 +7169,7 @@
           <a:p>
             <a:fld id="{169A2F6B-4E20-472E-BD1C-A374BC7CA75E}" type="datetimeFigureOut">
               <a:rPr lang="en-US" smtClean="0"/>
-              <a:t>2/17/2015</a:t>
+              <a:t>2/19/2015</a:t>
             </a:fld>
             <a:endParaRPr lang="en-US"/>
           </a:p>
@@ -7785,6 +7791,99 @@
           <a:p>
             <a:r>
               <a:rPr lang="en-US" dirty="0" smtClean="0"/>
+              <a:t>Method: Search() </a:t>
+            </a:r>
+            <a:endParaRPr lang="en-US" dirty="0"/>
+          </a:p>
+        </p:txBody>
+      </p:sp>
+      <p:sp>
+        <p:nvSpPr>
+          <p:cNvPr id="3" name="Content Placeholder 2"/>
+          <p:cNvSpPr>
+            <a:spLocks noGrp="1"/>
+          </p:cNvSpPr>
+          <p:nvPr>
+            <p:ph idx="1"/>
+          </p:nvPr>
+        </p:nvSpPr>
+        <p:spPr/>
+        <p:txBody>
+          <a:bodyPr/>
+          <a:lstStyle/>
+          <a:p>
+            <a:r>
+              <a:rPr lang="en-US" dirty="0" smtClean="0"/>
+              <a:t>Searches the table for one entry, based on data held in the entry</a:t>
+            </a:r>
+          </a:p>
+          <a:p>
+            <a:r>
+              <a:rPr lang="en-US" dirty="0" smtClean="0"/>
+              <a:t>The method uses the has method to determine where the data should be indexed</a:t>
+            </a:r>
+          </a:p>
+          <a:p>
+            <a:r>
+              <a:rPr lang="en-US" dirty="0" smtClean="0"/>
+              <a:t>If it isn’t found in that index the method preforms a linear probe down the table</a:t>
+            </a:r>
+          </a:p>
+          <a:p>
+            <a:endParaRPr lang="en-US" dirty="0" smtClean="0"/>
+          </a:p>
+          <a:p>
+            <a:endParaRPr lang="en-US" dirty="0"/>
+          </a:p>
+        </p:txBody>
+      </p:sp>
+    </p:spTree>
+    <p:extLst>
+      <p:ext uri="{BB962C8B-B14F-4D97-AF65-F5344CB8AC3E}">
+        <p14:creationId xmlns:p14="http://schemas.microsoft.com/office/powerpoint/2010/main" val="1895473914"/>
+      </p:ext>
+    </p:extLst>
+  </p:cSld>
+  <p:clrMapOvr>
+    <a:masterClrMapping/>
+  </p:clrMapOvr>
+</p:sld>
+</file>
+
+<file path=ppt/slides/slide11.xml><?xml version="1.0" encoding="utf-8"?>
+<p:sld xmlns:a="http://schemas.openxmlformats.org/drawingml/2006/main" xmlns:r="http://schemas.openxmlformats.org/officeDocument/2006/relationships" xmlns:p="http://schemas.openxmlformats.org/presentationml/2006/main">
+  <p:cSld>
+    <p:spTree>
+      <p:nvGrpSpPr>
+        <p:cNvPr id="1" name=""/>
+        <p:cNvGrpSpPr/>
+        <p:nvPr/>
+      </p:nvGrpSpPr>
+      <p:grpSpPr>
+        <a:xfrm>
+          <a:off x="0" y="0"/>
+          <a:ext cx="0" cy="0"/>
+          <a:chOff x="0" y="0"/>
+          <a:chExt cx="0" cy="0"/>
+        </a:xfrm>
+      </p:grpSpPr>
+      <p:sp>
+        <p:nvSpPr>
+          <p:cNvPr id="2" name="Title 1"/>
+          <p:cNvSpPr>
+            <a:spLocks noGrp="1"/>
+          </p:cNvSpPr>
+          <p:nvPr>
+            <p:ph type="title"/>
+          </p:nvPr>
+        </p:nvSpPr>
+        <p:spPr/>
+        <p:txBody>
+          <a:bodyPr/>
+          <a:lstStyle/>
+          <a:p>
+            <a:r>
+              <a:rPr lang="en-US" dirty="0" smtClean="0"/>
               <a:t>Method: Display()</a:t>
             </a:r>
             <a:endParaRPr lang="en-US" dirty="0"/>
@@ -7869,7 +7968,7 @@
 </p:sld>
 </file>
 
-<file path=ppt/slides/slide11.xml><?xml version="1.0" encoding="utf-8"?>
+<file path=ppt/slides/slide12.xml><?xml version="1.0" encoding="utf-8"?>
 <p:sld xmlns:a="http://schemas.openxmlformats.org/drawingml/2006/main" xmlns:r="http://schemas.openxmlformats.org/officeDocument/2006/relationships" xmlns:p="http://schemas.openxmlformats.org/presentationml/2006/main">
   <p:cSld>
     <p:spTree>
@@ -8785,8 +8884,13 @@
           <a:p>
             <a:r>
               <a:rPr lang="en-US" dirty="0" smtClean="0"/>
-              <a:t>This class has four methods</a:t>
-            </a:r>
+              <a:t>This class has </a:t>
+            </a:r>
+            <a:r>
+              <a:rPr lang="en-US" dirty="0" smtClean="0"/>
+              <a:t>five methods</a:t>
+            </a:r>
+            <a:endParaRPr lang="en-US" dirty="0" smtClean="0"/>
           </a:p>
           <a:p>
             <a:pPr lvl="1"/>
@@ -8806,8 +8910,20 @@
             <a:pPr lvl="1"/>
             <a:r>
               <a:rPr lang="en-US" dirty="0"/>
-              <a:t>Delete()</a:t>
-            </a:r>
+              <a:t>Delete</a:t>
+            </a:r>
+            <a:r>
+              <a:rPr lang="en-US" dirty="0" smtClean="0"/>
+              <a:t>()</a:t>
+            </a:r>
+          </a:p>
+          <a:p>
+            <a:pPr lvl="1"/>
+            <a:r>
+              <a:rPr lang="en-US" dirty="0" smtClean="0"/>
+              <a:t>Search()</a:t>
+            </a:r>
+            <a:endParaRPr lang="en-US" dirty="0"/>
           </a:p>
           <a:p>
             <a:pPr lvl="1"/>

</xml_diff>